<commit_message>
JK got bag of words by year to work pretty well, started plotting target words by year
</commit_message>
<xml_diff>
--- a/Slides/Results_slides.pptx
+++ b/Slides/Results_slides.pptx
@@ -105,6 +105,11 @@
       </a:defRPr>
     </a:lvl9pPr>
   </p:defaultTextStyle>
+  <p:extLst>
+    <p:ext uri="{EFAFB233-063F-42B5-8137-9DF3F51BA10A}">
+      <p15:sldGuideLst xmlns:p15="http://schemas.microsoft.com/office/powerpoint/2012/main"/>
+    </p:ext>
+  </p:extLst>
 </p:presentation>
 </file>
 
@@ -3386,14 +3391,14 @@
           <p:nvPr>
             <p:extLst>
               <p:ext uri="{D42A27DB-BD31-4B8C-83A1-F6EECF244321}">
-                <p14:modId xmlns:p14="http://schemas.microsoft.com/office/powerpoint/2010/main" val="3036228164"/>
+                <p14:modId xmlns:p14="http://schemas.microsoft.com/office/powerpoint/2010/main" val="1064396798"/>
               </p:ext>
             </p:extLst>
           </p:nvPr>
         </p:nvGraphicFramePr>
         <p:xfrm>
           <a:off x="440547" y="2036396"/>
-          <a:ext cx="11211798" cy="3035300"/>
+          <a:ext cx="10736519" cy="3035300"/>
         </p:xfrm>
         <a:graphic>
           <a:graphicData uri="http://schemas.openxmlformats.org/drawingml/2006/table">
@@ -3409,7 +3414,7 @@
                     </a:ext>
                   </a:extLst>
                 </a:gridCol>
-                <a:gridCol w="750996">
+                <a:gridCol w="693103">
                   <a:extLst>
                     <a:ext uri="{9D8B030D-6E8A-4147-A177-3AD203B41FA5}">
                       <a16:colId xmlns:a16="http://schemas.microsoft.com/office/drawing/2014/main" val="3603177584"/>
@@ -3423,70 +3428,70 @@
                     </a:ext>
                   </a:extLst>
                 </a:gridCol>
-                <a:gridCol w="884809">
+                <a:gridCol w="912178">
                   <a:extLst>
                     <a:ext uri="{9D8B030D-6E8A-4147-A177-3AD203B41FA5}">
                       <a16:colId xmlns:a16="http://schemas.microsoft.com/office/drawing/2014/main" val="2297954957"/>
                     </a:ext>
                   </a:extLst>
                 </a:gridCol>
-                <a:gridCol w="749364">
+                <a:gridCol w="690944">
                   <a:extLst>
                     <a:ext uri="{9D8B030D-6E8A-4147-A177-3AD203B41FA5}">
                       <a16:colId xmlns:a16="http://schemas.microsoft.com/office/drawing/2014/main" val="3369176656"/>
                     </a:ext>
                   </a:extLst>
                 </a:gridCol>
-                <a:gridCol w="675323">
+                <a:gridCol w="752475">
                   <a:extLst>
                     <a:ext uri="{9D8B030D-6E8A-4147-A177-3AD203B41FA5}">
                       <a16:colId xmlns:a16="http://schemas.microsoft.com/office/drawing/2014/main" val="1457118934"/>
                     </a:ext>
                   </a:extLst>
                 </a:gridCol>
-                <a:gridCol w="542925">
+                <a:gridCol w="481013">
                   <a:extLst>
                     <a:ext uri="{9D8B030D-6E8A-4147-A177-3AD203B41FA5}">
                       <a16:colId xmlns:a16="http://schemas.microsoft.com/office/drawing/2014/main" val="869975608"/>
                     </a:ext>
                   </a:extLst>
                 </a:gridCol>
-                <a:gridCol w="1328230">
+                <a:gridCol w="1180973">
                   <a:extLst>
                     <a:ext uri="{9D8B030D-6E8A-4147-A177-3AD203B41FA5}">
                       <a16:colId xmlns:a16="http://schemas.microsoft.com/office/drawing/2014/main" val="1626709284"/>
                     </a:ext>
                   </a:extLst>
                 </a:gridCol>
-                <a:gridCol w="626745">
+                <a:gridCol w="708406">
                   <a:extLst>
                     <a:ext uri="{9D8B030D-6E8A-4147-A177-3AD203B41FA5}">
                       <a16:colId xmlns:a16="http://schemas.microsoft.com/office/drawing/2014/main" val="2610771739"/>
                     </a:ext>
                   </a:extLst>
                 </a:gridCol>
-                <a:gridCol w="733743">
+                <a:gridCol w="663956">
                   <a:extLst>
                     <a:ext uri="{9D8B030D-6E8A-4147-A177-3AD203B41FA5}">
                       <a16:colId xmlns:a16="http://schemas.microsoft.com/office/drawing/2014/main" val="88834686"/>
                     </a:ext>
                   </a:extLst>
                 </a:gridCol>
-                <a:gridCol w="853567">
+                <a:gridCol w="755333">
                   <a:extLst>
                     <a:ext uri="{9D8B030D-6E8A-4147-A177-3AD203B41FA5}">
                       <a16:colId xmlns:a16="http://schemas.microsoft.com/office/drawing/2014/main" val="3357239286"/>
                     </a:ext>
                   </a:extLst>
                 </a:gridCol>
-                <a:gridCol w="747903">
+                <a:gridCol w="664083">
                   <a:extLst>
                     <a:ext uri="{9D8B030D-6E8A-4147-A177-3AD203B41FA5}">
                       <a16:colId xmlns:a16="http://schemas.microsoft.com/office/drawing/2014/main" val="1000004313"/>
                     </a:ext>
                   </a:extLst>
                 </a:gridCol>
-                <a:gridCol w="741363">
+                <a:gridCol w="657225">
                   <a:extLst>
                     <a:ext uri="{9D8B030D-6E8A-4147-A177-3AD203B41FA5}">
                       <a16:colId xmlns:a16="http://schemas.microsoft.com/office/drawing/2014/main" val="685521391"/>
@@ -4272,12 +4277,26 @@
                     <a:p>
                       <a:pPr algn="l" rtl="0" fontAlgn="ctr"/>
                       <a:r>
-                        <a:rPr lang="en-GB" sz="1600" u="none" strike="noStrike">
+                        <a:rPr lang="en-GB" sz="1600" dirty="0"/>
+                        <a:t>'patient</a:t>
+                      </a:r>
+                    </a:p>
+                  </a:txBody>
+                  <a:tcPr marL="6350" marR="6350" marT="6350" marB="0" anchor="ctr"/>
+                </a:tc>
+                <a:tc>
+                  <a:txBody>
+                    <a:bodyPr/>
+                    <a:lstStyle/>
+                    <a:p>
+                      <a:pPr algn="l" rtl="0" fontAlgn="ctr"/>
+                      <a:r>
+                        <a:rPr lang="en-GB" sz="1600" u="none" strike="noStrike" dirty="0">
                           <a:effectLst/>
                         </a:rPr>
                         <a:t>'gene'</a:t>
                       </a:r>
-                      <a:endParaRPr lang="en-GB" sz="1600" b="0" i="0" u="none" strike="noStrike">
+                      <a:endParaRPr lang="en-GB" sz="1600" b="0" i="0" u="none" strike="noStrike" dirty="0">
                         <a:solidFill>
                           <a:srgbClr val="000000"/>
                         </a:solidFill>
@@ -4295,12 +4314,24 @@
                     <a:p>
                       <a:pPr algn="l" rtl="0" fontAlgn="ctr"/>
                       <a:r>
-                        <a:rPr lang="en-GB" sz="1600" u="none" strike="noStrike">
-                          <a:effectLst/>
-                        </a:rPr>
-                        <a:t>'mutat'</a:t>
-                      </a:r>
-                      <a:endParaRPr lang="en-GB" sz="1600" b="0" i="0" u="none" strike="noStrike">
+                        <a:rPr lang="en-GB" sz="1600" u="none" strike="noStrike" dirty="0">
+                          <a:effectLst/>
+                        </a:rPr>
+                        <a:t>'</a:t>
+                      </a:r>
+                      <a:r>
+                        <a:rPr lang="en-GB" sz="1600" u="none" strike="noStrike" dirty="0" err="1">
+                          <a:effectLst/>
+                        </a:rPr>
+                        <a:t>syndrom</a:t>
+                      </a:r>
+                      <a:r>
+                        <a:rPr lang="en-GB" sz="1600" u="none" strike="noStrike" dirty="0">
+                          <a:effectLst/>
+                        </a:rPr>
+                        <a:t>' </a:t>
+                      </a:r>
+                      <a:endParaRPr lang="en-GB" sz="1600" b="0" i="0" u="none" strike="noStrike" dirty="0">
                         <a:solidFill>
                           <a:srgbClr val="000000"/>
                         </a:solidFill>
@@ -4318,12 +4349,24 @@
                     <a:p>
                       <a:pPr algn="l" rtl="0" fontAlgn="ctr"/>
                       <a:r>
-                        <a:rPr lang="en-GB" sz="1600" u="none" strike="noStrike">
-                          <a:effectLst/>
-                        </a:rPr>
-                        <a:t>'patient' </a:t>
-                      </a:r>
-                      <a:endParaRPr lang="en-GB" sz="1600" b="0" i="0" u="none" strike="noStrike">
+                        <a:rPr lang="en-GB" sz="1600" u="none" strike="noStrike" dirty="0">
+                          <a:effectLst/>
+                        </a:rPr>
+                        <a:t>'</a:t>
+                      </a:r>
+                      <a:r>
+                        <a:rPr lang="en-GB" sz="1600" u="none" strike="noStrike" dirty="0" err="1">
+                          <a:effectLst/>
+                        </a:rPr>
+                        <a:t>mutat</a:t>
+                      </a:r>
+                      <a:r>
+                        <a:rPr lang="en-GB" sz="1600" u="none" strike="noStrike" dirty="0">
+                          <a:effectLst/>
+                        </a:rPr>
+                        <a:t>' </a:t>
+                      </a:r>
+                      <a:endParaRPr lang="en-GB" sz="1600" b="0" i="0" u="none" strike="noStrike" dirty="0">
                         <a:solidFill>
                           <a:srgbClr val="000000"/>
                         </a:solidFill>
@@ -4341,12 +4384,128 @@
                     <a:p>
                       <a:pPr algn="l" rtl="0" fontAlgn="ctr"/>
                       <a:r>
-                        <a:rPr lang="en-GB" sz="1600" u="none" strike="noStrike">
+                        <a:rPr lang="en-GB" sz="1600" u="none" strike="noStrike" dirty="0">
+                          <a:effectLst/>
+                        </a:rPr>
+                        <a:t>'autism' </a:t>
+                      </a:r>
+                      <a:endParaRPr lang="en-GB" sz="1600" b="0" i="0" u="none" strike="noStrike" dirty="0">
+                        <a:solidFill>
+                          <a:srgbClr val="000000"/>
+                        </a:solidFill>
+                        <a:effectLst/>
+                        <a:latin typeface="Calibri" panose="020F0502020204030204" pitchFamily="34" charset="0"/>
+                      </a:endParaRPr>
+                    </a:p>
+                  </a:txBody>
+                  <a:tcPr marL="6350" marR="6350" marT="6350" marB="0" anchor="ctr"/>
+                </a:tc>
+                <a:tc>
+                  <a:txBody>
+                    <a:bodyPr/>
+                    <a:lstStyle/>
+                    <a:p>
+                      <a:pPr algn="l" rtl="0" fontAlgn="ctr"/>
+                      <a:r>
+                        <a:rPr lang="en-GB" sz="1600" u="none" strike="noStrike" dirty="0">
+                          <a:effectLst/>
+                        </a:rPr>
+                        <a:t>'</a:t>
+                      </a:r>
+                      <a:r>
+                        <a:rPr lang="en-GB" sz="1600" u="none" strike="noStrike" dirty="0" err="1">
+                          <a:effectLst/>
+                        </a:rPr>
+                        <a:t>asd</a:t>
+                      </a:r>
+                      <a:r>
+                        <a:rPr lang="en-GB" sz="1600" u="none" strike="noStrike" dirty="0">
+                          <a:effectLst/>
+                        </a:rPr>
+                        <a:t>' </a:t>
+                      </a:r>
+                      <a:endParaRPr lang="en-GB" sz="1600" b="0" i="0" u="none" strike="noStrike" dirty="0">
+                        <a:solidFill>
+                          <a:srgbClr val="000000"/>
+                        </a:solidFill>
+                        <a:effectLst/>
+                        <a:latin typeface="Calibri" panose="020F0502020204030204" pitchFamily="34" charset="0"/>
+                      </a:endParaRPr>
+                    </a:p>
+                  </a:txBody>
+                  <a:tcPr marL="6350" marR="6350" marT="6350" marB="0" anchor="ctr"/>
+                </a:tc>
+                <a:tc>
+                  <a:txBody>
+                    <a:bodyPr/>
+                    <a:lstStyle/>
+                    <a:p>
+                      <a:pPr algn="l" rtl="0" fontAlgn="ctr"/>
+                      <a:r>
+                        <a:rPr lang="en-GB" sz="1600" u="none" strike="noStrike" dirty="0">
+                          <a:effectLst/>
+                        </a:rPr>
+                        <a:t>'clinic' </a:t>
+                      </a:r>
+                      <a:endParaRPr lang="en-GB" sz="1600" b="0" i="0" u="none" strike="noStrike" dirty="0">
+                        <a:solidFill>
+                          <a:srgbClr val="000000"/>
+                        </a:solidFill>
+                        <a:effectLst/>
+                        <a:latin typeface="Calibri" panose="020F0502020204030204" pitchFamily="34" charset="0"/>
+                      </a:endParaRPr>
+                    </a:p>
+                  </a:txBody>
+                  <a:tcPr marL="6350" marR="6350" marT="6350" marB="0" anchor="ctr"/>
+                </a:tc>
+                <a:tc>
+                  <a:txBody>
+                    <a:bodyPr/>
+                    <a:lstStyle/>
+                    <a:p>
+                      <a:pPr algn="l" rtl="0" fontAlgn="ctr"/>
+                      <a:r>
+                        <a:rPr lang="en-GB" sz="1600" u="none" strike="noStrike" dirty="0">
+                          <a:effectLst/>
+                        </a:rPr>
+                        <a:t>'</a:t>
+                      </a:r>
+                      <a:r>
+                        <a:rPr lang="en-GB" sz="1600" u="none" strike="noStrike" dirty="0" err="1">
+                          <a:effectLst/>
+                        </a:rPr>
+                        <a:t>disord</a:t>
+                      </a:r>
+                      <a:r>
+                        <a:rPr lang="en-GB" sz="1600" u="none" strike="noStrike" dirty="0">
+                          <a:effectLst/>
+                        </a:rPr>
+                        <a:t>' </a:t>
+                      </a:r>
+                      <a:endParaRPr lang="en-GB" sz="1600" b="0" i="0" u="none" strike="noStrike" dirty="0">
+                        <a:solidFill>
+                          <a:srgbClr val="000000"/>
+                        </a:solidFill>
+                        <a:effectLst/>
+                        <a:latin typeface="Calibri" panose="020F0502020204030204" pitchFamily="34" charset="0"/>
+                      </a:endParaRPr>
+                    </a:p>
+                  </a:txBody>
+                  <a:tcPr marL="6350" marR="6350" marT="6350" marB="0" anchor="ctr"/>
+                </a:tc>
+                <a:tc>
+                  <a:txBody>
+                    <a:bodyPr/>
+                    <a:lstStyle/>
+                    <a:p>
+                      <a:pPr algn="l" rtl="0" fontAlgn="ctr"/>
+                      <a:r>
+                        <a:rPr lang="en-GB" sz="1600" u="none" strike="noStrike" dirty="0">
                           <a:effectLst/>
                         </a:rPr>
                         <a:t>'genet' </a:t>
                       </a:r>
-                      <a:endParaRPr lang="en-GB" sz="1600" b="0" i="0" u="none" strike="noStrike">
+                      <a:endParaRPr lang="en-GB" sz="1600" b="0" i="0" u="none" strike="noStrike" dirty="0">
                         <a:solidFill>
                           <a:srgbClr val="000000"/>
                         </a:solidFill>
@@ -4364,127 +4523,24 @@
                     <a:p>
                       <a:pPr algn="l" rtl="0" fontAlgn="ctr"/>
                       <a:r>
-                        <a:rPr lang="en-GB" sz="1600" u="none" strike="noStrike">
-                          <a:effectLst/>
-                        </a:rPr>
-                        <a:t>'studi' </a:t>
-                      </a:r>
-                      <a:endParaRPr lang="en-GB" sz="1600" b="0" i="0" u="none" strike="noStrike">
-                        <a:solidFill>
-                          <a:srgbClr val="000000"/>
-                        </a:solidFill>
-                        <a:effectLst/>
-                        <a:latin typeface="Calibri" panose="020F0502020204030204" pitchFamily="34" charset="0"/>
-                      </a:endParaRPr>
-                    </a:p>
-                  </a:txBody>
-                  <a:tcPr marL="6350" marR="6350" marT="6350" marB="0" anchor="ctr"/>
-                </a:tc>
-                <a:tc>
-                  <a:txBody>
-                    <a:bodyPr/>
-                    <a:lstStyle/>
-                    <a:p>
-                      <a:pPr algn="l" rtl="0" fontAlgn="ctr"/>
-                      <a:r>
-                        <a:rPr lang="en-GB" sz="1600" u="none" strike="noStrike">
-                          <a:effectLst/>
-                        </a:rPr>
-                        <a:t>'use' </a:t>
-                      </a:r>
-                      <a:endParaRPr lang="en-GB" sz="1600" b="0" i="0" u="none" strike="noStrike">
-                        <a:solidFill>
-                          <a:srgbClr val="000000"/>
-                        </a:solidFill>
-                        <a:effectLst/>
-                        <a:latin typeface="Calibri" panose="020F0502020204030204" pitchFamily="34" charset="0"/>
-                      </a:endParaRPr>
-                    </a:p>
-                  </a:txBody>
-                  <a:tcPr marL="6350" marR="6350" marT="6350" marB="0" anchor="ctr"/>
-                </a:tc>
-                <a:tc>
-                  <a:txBody>
-                    <a:bodyPr/>
-                    <a:lstStyle/>
-                    <a:p>
-                      <a:pPr algn="l" rtl="0" fontAlgn="ctr"/>
-                      <a:r>
-                        <a:rPr lang="en-GB" sz="1600" u="none" strike="noStrike">
-                          <a:effectLst/>
-                        </a:rPr>
-                        <a:t>'chromosom' </a:t>
-                      </a:r>
-                      <a:endParaRPr lang="en-GB" sz="1600" b="0" i="0" u="none" strike="noStrike">
-                        <a:solidFill>
-                          <a:srgbClr val="000000"/>
-                        </a:solidFill>
-                        <a:effectLst/>
-                        <a:latin typeface="Calibri" panose="020F0502020204030204" pitchFamily="34" charset="0"/>
-                      </a:endParaRPr>
-                    </a:p>
-                  </a:txBody>
-                  <a:tcPr marL="6350" marR="6350" marT="6350" marB="0" anchor="ctr"/>
-                </a:tc>
-                <a:tc>
-                  <a:txBody>
-                    <a:bodyPr/>
-                    <a:lstStyle/>
-                    <a:p>
-                      <a:pPr algn="l" rtl="0" fontAlgn="ctr"/>
-                      <a:r>
-                        <a:rPr lang="en-GB" sz="1600" u="none" strike="noStrike">
-                          <a:effectLst/>
-                        </a:rPr>
-                        <a:t>'case' </a:t>
-                      </a:r>
-                      <a:endParaRPr lang="en-GB" sz="1600" b="0" i="0" u="none" strike="noStrike">
-                        <a:solidFill>
-                          <a:srgbClr val="000000"/>
-                        </a:solidFill>
-                        <a:effectLst/>
-                        <a:latin typeface="Calibri" panose="020F0502020204030204" pitchFamily="34" charset="0"/>
-                      </a:endParaRPr>
-                    </a:p>
-                  </a:txBody>
-                  <a:tcPr marL="6350" marR="6350" marT="6350" marB="0" anchor="ctr"/>
-                </a:tc>
-                <a:tc>
-                  <a:txBody>
-                    <a:bodyPr/>
-                    <a:lstStyle/>
-                    <a:p>
-                      <a:pPr algn="l" rtl="0" fontAlgn="ctr"/>
-                      <a:r>
-                        <a:rPr lang="en-GB" sz="1600" u="none" strike="noStrike">
-                          <a:effectLst/>
-                        </a:rPr>
-                        <a:t>'famili' </a:t>
-                      </a:r>
-                      <a:endParaRPr lang="en-GB" sz="1600" b="0" i="0" u="none" strike="noStrike">
-                        <a:solidFill>
-                          <a:srgbClr val="000000"/>
-                        </a:solidFill>
-                        <a:effectLst/>
-                        <a:latin typeface="Calibri" panose="020F0502020204030204" pitchFamily="34" charset="0"/>
-                      </a:endParaRPr>
-                    </a:p>
-                  </a:txBody>
-                  <a:tcPr marL="6350" marR="6350" marT="6350" marB="0" anchor="ctr"/>
-                </a:tc>
-                <a:tc>
-                  <a:txBody>
-                    <a:bodyPr/>
-                    <a:lstStyle/>
-                    <a:p>
-                      <a:pPr algn="l" rtl="0" fontAlgn="ctr"/>
-                      <a:r>
-                        <a:rPr lang="en-GB" sz="1600" u="none" strike="noStrike">
-                          <a:effectLst/>
-                        </a:rPr>
-                        <a:t>'analysi' </a:t>
-                      </a:r>
-                      <a:endParaRPr lang="en-GB" sz="1600" b="0" i="0" u="none" strike="noStrike">
+                        <a:rPr lang="en-GB" sz="1600" u="none" strike="noStrike" dirty="0">
+                          <a:effectLst/>
+                        </a:rPr>
+                        <a:t>'</a:t>
+                      </a:r>
+                      <a:r>
+                        <a:rPr lang="en-GB" sz="1600" u="none" strike="noStrike" dirty="0" err="1">
+                          <a:effectLst/>
+                        </a:rPr>
+                        <a:t>studi</a:t>
+                      </a:r>
+                      <a:r>
+                        <a:rPr lang="en-GB" sz="1600" u="none" strike="noStrike" dirty="0">
+                          <a:effectLst/>
+                        </a:rPr>
+                        <a:t>' </a:t>
+                      </a:r>
+                      <a:endParaRPr lang="en-GB" sz="1600" b="0" i="0" u="none" strike="noStrike" dirty="0">
                         <a:solidFill>
                           <a:srgbClr val="000000"/>
                         </a:solidFill>
@@ -4626,7 +4682,7 @@
                       <a:pPr algn="ctr" rtl="0" fontAlgn="ctr"/>
                       <a:r>
                         <a:rPr lang="en-GB" sz="1600" dirty="0"/>
-                        <a:t>10339</a:t>
+                        <a:t>286</a:t>
                       </a:r>
                       <a:endParaRPr lang="en-GB" sz="1600" b="0" i="0" u="none" strike="noStrike" dirty="0">
                         <a:solidFill>
@@ -4669,12 +4725,10 @@
                     <a:p>
                       <a:pPr algn="l" rtl="0" fontAlgn="ctr"/>
                       <a:r>
-                        <a:rPr lang="en-GB" sz="1600" u="none" strike="noStrike">
-                          <a:effectLst/>
-                        </a:rPr>
-                        <a:t>7869</a:t>
-                      </a:r>
-                      <a:endParaRPr lang="en-GB" sz="1600" b="0" i="0" u="none" strike="noStrike">
+                        <a:rPr lang="en-GB" sz="1600" dirty="0"/>
+                        <a:t>187</a:t>
+                      </a:r>
+                      <a:endParaRPr lang="en-GB" sz="1600" b="0" i="0" u="none" strike="noStrike" dirty="0">
                         <a:solidFill>
                           <a:srgbClr val="000000"/>
                         </a:solidFill>
@@ -4692,12 +4746,10 @@
                     <a:p>
                       <a:pPr algn="l" rtl="0" fontAlgn="ctr"/>
                       <a:r>
-                        <a:rPr lang="en-GB" sz="1600" u="none" strike="noStrike">
-                          <a:effectLst/>
-                        </a:rPr>
-                        <a:t>5614</a:t>
-                      </a:r>
-                      <a:endParaRPr lang="en-GB" sz="1600" b="0" i="0" u="none" strike="noStrike">
+                        <a:rPr lang="en-GB" sz="1600" dirty="0"/>
+                        <a:t>180</a:t>
+                      </a:r>
+                      <a:endParaRPr lang="en-GB" sz="1600" b="0" i="0" u="none" strike="noStrike" dirty="0">
                         <a:solidFill>
                           <a:srgbClr val="000000"/>
                         </a:solidFill>
@@ -4715,12 +4767,10 @@
                     <a:p>
                       <a:pPr algn="l" rtl="0" fontAlgn="ctr"/>
                       <a:r>
-                        <a:rPr lang="en-GB" sz="1600" u="none" strike="noStrike">
-                          <a:effectLst/>
-                        </a:rPr>
-                        <a:t>4689</a:t>
-                      </a:r>
-                      <a:endParaRPr lang="en-GB" sz="1600" b="0" i="0" u="none" strike="noStrike">
+                        <a:rPr lang="en-GB" sz="1600" dirty="0"/>
+                        <a:t>165</a:t>
+                      </a:r>
+                      <a:endParaRPr lang="en-GB" sz="1600" b="0" i="0" u="none" strike="noStrike" dirty="0">
                         <a:solidFill>
                           <a:srgbClr val="000000"/>
                         </a:solidFill>
@@ -4738,12 +4788,10 @@
                     <a:p>
                       <a:pPr algn="l" rtl="0" fontAlgn="ctr"/>
                       <a:r>
-                        <a:rPr lang="en-GB" sz="1600" u="none" strike="noStrike">
-                          <a:effectLst/>
-                        </a:rPr>
-                        <a:t>4474</a:t>
-                      </a:r>
-                      <a:endParaRPr lang="en-GB" sz="1600" b="0" i="0" u="none" strike="noStrike">
+                        <a:rPr lang="en-GB" sz="1600" dirty="0"/>
+                        <a:t>155</a:t>
+                      </a:r>
+                      <a:endParaRPr lang="en-GB" sz="1600" b="0" i="0" u="none" strike="noStrike" dirty="0">
                         <a:solidFill>
                           <a:srgbClr val="000000"/>
                         </a:solidFill>
@@ -4761,12 +4809,10 @@
                     <a:p>
                       <a:pPr algn="l" rtl="0" fontAlgn="ctr"/>
                       <a:r>
-                        <a:rPr lang="en-GB" sz="1600" u="none" strike="noStrike">
-                          <a:effectLst/>
-                        </a:rPr>
-                        <a:t>4136</a:t>
-                      </a:r>
-                      <a:endParaRPr lang="en-GB" sz="1600" b="0" i="0" u="none" strike="noStrike">
+                        <a:rPr lang="en-GB" sz="1600" dirty="0"/>
+                        <a:t>149</a:t>
+                      </a:r>
+                      <a:endParaRPr lang="en-GB" sz="1600" b="0" i="0" u="none" strike="noStrike" dirty="0">
                         <a:solidFill>
                           <a:srgbClr val="000000"/>
                         </a:solidFill>
@@ -4784,12 +4830,10 @@
                     <a:p>
                       <a:pPr algn="l" rtl="0" fontAlgn="ctr"/>
                       <a:r>
-                        <a:rPr lang="en-GB" sz="1600" u="none" strike="noStrike">
-                          <a:effectLst/>
-                        </a:rPr>
-                        <a:t>4070</a:t>
-                      </a:r>
-                      <a:endParaRPr lang="en-GB" sz="1600" b="0" i="0" u="none" strike="noStrike">
+                        <a:rPr lang="en-GB" sz="1600" dirty="0"/>
+                        <a:t>146</a:t>
+                      </a:r>
+                      <a:endParaRPr lang="en-GB" sz="1600" b="0" i="0" u="none" strike="noStrike" dirty="0">
                         <a:solidFill>
                           <a:srgbClr val="000000"/>
                         </a:solidFill>
@@ -4807,12 +4851,10 @@
                     <a:p>
                       <a:pPr algn="l" rtl="0" fontAlgn="ctr"/>
                       <a:r>
-                        <a:rPr lang="en-GB" sz="1600" u="none" strike="noStrike">
-                          <a:effectLst/>
-                        </a:rPr>
-                        <a:t>4064</a:t>
-                      </a:r>
-                      <a:endParaRPr lang="en-GB" sz="1600" b="0" i="0" u="none" strike="noStrike">
+                        <a:rPr lang="en-GB" sz="1600" dirty="0"/>
+                        <a:t>145</a:t>
+                      </a:r>
+                      <a:endParaRPr lang="en-GB" sz="1600" b="0" i="0" u="none" strike="noStrike" dirty="0">
                         <a:solidFill>
                           <a:srgbClr val="000000"/>
                         </a:solidFill>
@@ -4830,12 +4872,12 @@
                     <a:p>
                       <a:pPr algn="l" rtl="0" fontAlgn="ctr"/>
                       <a:r>
-                        <a:rPr lang="en-GB" sz="1600" u="none" strike="noStrike">
-                          <a:effectLst/>
-                        </a:rPr>
-                        <a:t>3883</a:t>
-                      </a:r>
-                      <a:endParaRPr lang="en-GB" sz="1600" b="0" i="0" u="none" strike="noStrike">
+                        <a:rPr lang="en-GB" sz="1600" u="none" strike="noStrike" dirty="0">
+                          <a:effectLst/>
+                        </a:rPr>
+                        <a:t>142</a:t>
+                      </a:r>
+                      <a:endParaRPr lang="en-GB" sz="1600" b="0" i="0" u="none" strike="noStrike" dirty="0">
                         <a:solidFill>
                           <a:srgbClr val="000000"/>
                         </a:solidFill>
@@ -4853,12 +4895,12 @@
                     <a:p>
                       <a:pPr algn="l" rtl="0" fontAlgn="ctr"/>
                       <a:r>
-                        <a:rPr lang="en-GB" sz="1600" u="none" strike="noStrike">
-                          <a:effectLst/>
-                        </a:rPr>
-                        <a:t>3821</a:t>
-                      </a:r>
-                      <a:endParaRPr lang="en-GB" sz="1600" b="0" i="0" u="none" strike="noStrike">
+                        <a:rPr lang="en-GB" sz="1600" u="none" strike="noStrike" dirty="0">
+                          <a:effectLst/>
+                        </a:rPr>
+                        <a:t>138</a:t>
+                      </a:r>
+                      <a:endParaRPr lang="en-GB" sz="1600" b="0" i="0" u="none" strike="noStrike" dirty="0">
                         <a:solidFill>
                           <a:srgbClr val="000000"/>
                         </a:solidFill>
@@ -4876,12 +4918,12 @@
                     <a:p>
                       <a:pPr algn="l" rtl="0" fontAlgn="ctr"/>
                       <a:r>
-                        <a:rPr lang="en-GB" sz="1600" u="none" strike="noStrike">
-                          <a:effectLst/>
-                        </a:rPr>
-                        <a:t>3400</a:t>
-                      </a:r>
-                      <a:endParaRPr lang="en-GB" sz="1600" b="0" i="0" u="none" strike="noStrike">
+                        <a:rPr lang="en-GB" sz="1600" u="none" strike="noStrike" dirty="0">
+                          <a:effectLst/>
+                        </a:rPr>
+                        <a:t>134</a:t>
+                      </a:r>
+                      <a:endParaRPr lang="en-GB" sz="1600" b="0" i="0" u="none" strike="noStrike" dirty="0">
                         <a:solidFill>
                           <a:srgbClr val="000000"/>
                         </a:solidFill>
@@ -4902,7 +4944,7 @@
                         <a:rPr lang="en-GB" sz="1600" u="none" strike="noStrike" dirty="0">
                           <a:effectLst/>
                         </a:rPr>
-                        <a:t>3240</a:t>
+                        <a:t>123</a:t>
                       </a:r>
                       <a:endParaRPr lang="en-GB" sz="1600" b="0" i="0" u="none" strike="noStrike" dirty="0">
                         <a:solidFill>

</xml_diff>

<commit_message>
got word counts by year to plot
</commit_message>
<xml_diff>
--- a/Slides/Results_slides.pptx
+++ b/Slides/Results_slides.pptx
@@ -262,7 +262,7 @@
           <a:p>
             <a:fld id="{6B2E31D3-D513-4509-92E7-11288EB68A6C}" type="datetimeFigureOut">
               <a:rPr lang="en-GB" smtClean="0"/>
-              <a:t>18/05/2023</a:t>
+              <a:t>22/05/2023</a:t>
             </a:fld>
             <a:endParaRPr lang="en-GB"/>
           </a:p>
@@ -462,7 +462,7 @@
           <a:p>
             <a:fld id="{6B2E31D3-D513-4509-92E7-11288EB68A6C}" type="datetimeFigureOut">
               <a:rPr lang="en-GB" smtClean="0"/>
-              <a:t>18/05/2023</a:t>
+              <a:t>22/05/2023</a:t>
             </a:fld>
             <a:endParaRPr lang="en-GB"/>
           </a:p>
@@ -672,7 +672,7 @@
           <a:p>
             <a:fld id="{6B2E31D3-D513-4509-92E7-11288EB68A6C}" type="datetimeFigureOut">
               <a:rPr lang="en-GB" smtClean="0"/>
-              <a:t>18/05/2023</a:t>
+              <a:t>22/05/2023</a:t>
             </a:fld>
             <a:endParaRPr lang="en-GB"/>
           </a:p>
@@ -872,7 +872,7 @@
           <a:p>
             <a:fld id="{6B2E31D3-D513-4509-92E7-11288EB68A6C}" type="datetimeFigureOut">
               <a:rPr lang="en-GB" smtClean="0"/>
-              <a:t>18/05/2023</a:t>
+              <a:t>22/05/2023</a:t>
             </a:fld>
             <a:endParaRPr lang="en-GB"/>
           </a:p>
@@ -1148,7 +1148,7 @@
           <a:p>
             <a:fld id="{6B2E31D3-D513-4509-92E7-11288EB68A6C}" type="datetimeFigureOut">
               <a:rPr lang="en-GB" smtClean="0"/>
-              <a:t>18/05/2023</a:t>
+              <a:t>22/05/2023</a:t>
             </a:fld>
             <a:endParaRPr lang="en-GB"/>
           </a:p>
@@ -1416,7 +1416,7 @@
           <a:p>
             <a:fld id="{6B2E31D3-D513-4509-92E7-11288EB68A6C}" type="datetimeFigureOut">
               <a:rPr lang="en-GB" smtClean="0"/>
-              <a:t>18/05/2023</a:t>
+              <a:t>22/05/2023</a:t>
             </a:fld>
             <a:endParaRPr lang="en-GB"/>
           </a:p>
@@ -1831,7 +1831,7 @@
           <a:p>
             <a:fld id="{6B2E31D3-D513-4509-92E7-11288EB68A6C}" type="datetimeFigureOut">
               <a:rPr lang="en-GB" smtClean="0"/>
-              <a:t>18/05/2023</a:t>
+              <a:t>22/05/2023</a:t>
             </a:fld>
             <a:endParaRPr lang="en-GB"/>
           </a:p>
@@ -1973,7 +1973,7 @@
           <a:p>
             <a:fld id="{6B2E31D3-D513-4509-92E7-11288EB68A6C}" type="datetimeFigureOut">
               <a:rPr lang="en-GB" smtClean="0"/>
-              <a:t>18/05/2023</a:t>
+              <a:t>22/05/2023</a:t>
             </a:fld>
             <a:endParaRPr lang="en-GB"/>
           </a:p>
@@ -2086,7 +2086,7 @@
           <a:p>
             <a:fld id="{6B2E31D3-D513-4509-92E7-11288EB68A6C}" type="datetimeFigureOut">
               <a:rPr lang="en-GB" smtClean="0"/>
-              <a:t>18/05/2023</a:t>
+              <a:t>22/05/2023</a:t>
             </a:fld>
             <a:endParaRPr lang="en-GB"/>
           </a:p>
@@ -2399,7 +2399,7 @@
           <a:p>
             <a:fld id="{6B2E31D3-D513-4509-92E7-11288EB68A6C}" type="datetimeFigureOut">
               <a:rPr lang="en-GB" smtClean="0"/>
-              <a:t>18/05/2023</a:t>
+              <a:t>22/05/2023</a:t>
             </a:fld>
             <a:endParaRPr lang="en-GB"/>
           </a:p>
@@ -2688,7 +2688,7 @@
           <a:p>
             <a:fld id="{6B2E31D3-D513-4509-92E7-11288EB68A6C}" type="datetimeFigureOut">
               <a:rPr lang="en-GB" smtClean="0"/>
-              <a:t>18/05/2023</a:t>
+              <a:t>22/05/2023</a:t>
             </a:fld>
             <a:endParaRPr lang="en-GB"/>
           </a:p>
@@ -2931,7 +2931,7 @@
           <a:p>
             <a:fld id="{6B2E31D3-D513-4509-92E7-11288EB68A6C}" type="datetimeFigureOut">
               <a:rPr lang="en-GB" smtClean="0"/>
-              <a:t>18/05/2023</a:t>
+              <a:t>22/05/2023</a:t>
             </a:fld>
             <a:endParaRPr lang="en-GB"/>
           </a:p>
@@ -3391,14 +3391,14 @@
           <p:nvPr>
             <p:extLst>
               <p:ext uri="{D42A27DB-BD31-4B8C-83A1-F6EECF244321}">
-                <p14:modId xmlns:p14="http://schemas.microsoft.com/office/powerpoint/2010/main" val="1064396798"/>
+                <p14:modId xmlns:p14="http://schemas.microsoft.com/office/powerpoint/2010/main" val="924727632"/>
               </p:ext>
             </p:extLst>
           </p:nvPr>
         </p:nvGraphicFramePr>
         <p:xfrm>
           <a:off x="440547" y="2036396"/>
-          <a:ext cx="10736519" cy="3035300"/>
+          <a:ext cx="11407294" cy="3035300"/>
         </p:xfrm>
         <a:graphic>
           <a:graphicData uri="http://schemas.openxmlformats.org/drawingml/2006/table">
@@ -3407,7 +3407,7 @@
                 <a:tableStyleId>{5C22544A-7EE6-4342-B048-85BDC9FD1C3A}</a:tableStyleId>
               </a:tblPr>
               <a:tblGrid>
-                <a:gridCol w="988949">
+                <a:gridCol w="979210">
                   <a:extLst>
                     <a:ext uri="{9D8B030D-6E8A-4147-A177-3AD203B41FA5}">
                       <a16:colId xmlns:a16="http://schemas.microsoft.com/office/drawing/2014/main" val="2406688920"/>
@@ -3421,63 +3421,63 @@
                     </a:ext>
                   </a:extLst>
                 </a:gridCol>
-                <a:gridCol w="644906">
+                <a:gridCol w="737553">
                   <a:extLst>
                     <a:ext uri="{9D8B030D-6E8A-4147-A177-3AD203B41FA5}">
                       <a16:colId xmlns:a16="http://schemas.microsoft.com/office/drawing/2014/main" val="410188219"/>
                     </a:ext>
                   </a:extLst>
                 </a:gridCol>
-                <a:gridCol w="912178">
+                <a:gridCol w="752475">
                   <a:extLst>
                     <a:ext uri="{9D8B030D-6E8A-4147-A177-3AD203B41FA5}">
                       <a16:colId xmlns:a16="http://schemas.microsoft.com/office/drawing/2014/main" val="2297954957"/>
                     </a:ext>
                   </a:extLst>
                 </a:gridCol>
-                <a:gridCol w="690944">
+                <a:gridCol w="912178">
                   <a:extLst>
                     <a:ext uri="{9D8B030D-6E8A-4147-A177-3AD203B41FA5}">
                       <a16:colId xmlns:a16="http://schemas.microsoft.com/office/drawing/2014/main" val="3369176656"/>
                     </a:ext>
                   </a:extLst>
                 </a:gridCol>
-                <a:gridCol w="752475">
+                <a:gridCol w="690944">
                   <a:extLst>
                     <a:ext uri="{9D8B030D-6E8A-4147-A177-3AD203B41FA5}">
                       <a16:colId xmlns:a16="http://schemas.microsoft.com/office/drawing/2014/main" val="1457118934"/>
                     </a:ext>
                   </a:extLst>
                 </a:gridCol>
-                <a:gridCol w="481013">
+                <a:gridCol w="708406">
                   <a:extLst>
                     <a:ext uri="{9D8B030D-6E8A-4147-A177-3AD203B41FA5}">
                       <a16:colId xmlns:a16="http://schemas.microsoft.com/office/drawing/2014/main" val="869975608"/>
                     </a:ext>
                   </a:extLst>
                 </a:gridCol>
-                <a:gridCol w="1180973">
+                <a:gridCol w="615950">
                   <a:extLst>
                     <a:ext uri="{9D8B030D-6E8A-4147-A177-3AD203B41FA5}">
                       <a16:colId xmlns:a16="http://schemas.microsoft.com/office/drawing/2014/main" val="1626709284"/>
                     </a:ext>
                   </a:extLst>
                 </a:gridCol>
-                <a:gridCol w="708406">
+                <a:gridCol w="1180973">
                   <a:extLst>
                     <a:ext uri="{9D8B030D-6E8A-4147-A177-3AD203B41FA5}">
                       <a16:colId xmlns:a16="http://schemas.microsoft.com/office/drawing/2014/main" val="2610771739"/>
                     </a:ext>
                   </a:extLst>
                 </a:gridCol>
-                <a:gridCol w="663956">
+                <a:gridCol w="755333">
                   <a:extLst>
                     <a:ext uri="{9D8B030D-6E8A-4147-A177-3AD203B41FA5}">
                       <a16:colId xmlns:a16="http://schemas.microsoft.com/office/drawing/2014/main" val="88834686"/>
                     </a:ext>
                   </a:extLst>
                 </a:gridCol>
-                <a:gridCol w="755333">
+                <a:gridCol w="648462">
                   <a:extLst>
                     <a:ext uri="{9D8B030D-6E8A-4147-A177-3AD203B41FA5}">
                       <a16:colId xmlns:a16="http://schemas.microsoft.com/office/drawing/2014/main" val="3357239286"/>
@@ -3491,14 +3491,14 @@
                     </a:ext>
                   </a:extLst>
                 </a:gridCol>
-                <a:gridCol w="657225">
+                <a:gridCol w="1134936">
                   <a:extLst>
                     <a:ext uri="{9D8B030D-6E8A-4147-A177-3AD203B41FA5}">
                       <a16:colId xmlns:a16="http://schemas.microsoft.com/office/drawing/2014/main" val="685521391"/>
                     </a:ext>
                   </a:extLst>
                 </a:gridCol>
-                <a:gridCol w="942975">
+                <a:gridCol w="933688">
                   <a:extLst>
                     <a:ext uri="{9D8B030D-6E8A-4147-A177-3AD203B41FA5}">
                       <a16:colId xmlns:a16="http://schemas.microsoft.com/office/drawing/2014/main" val="778782626"/>
@@ -3563,19 +3563,7 @@
                         <a:rPr lang="en-GB" sz="1600" u="none" strike="noStrike" dirty="0">
                           <a:effectLst/>
                         </a:rPr>
-                        <a:t>'</a:t>
-                      </a:r>
-                      <a:r>
-                        <a:rPr lang="en-GB" sz="1600" u="none" strike="noStrike" dirty="0" err="1">
-                          <a:effectLst/>
-                        </a:rPr>
-                        <a:t>mutat</a:t>
-                      </a:r>
-                      <a:r>
-                        <a:rPr lang="en-GB" sz="1600" u="none" strike="noStrike" dirty="0">
-                          <a:effectLst/>
-                        </a:rPr>
-                        <a:t>'</a:t>
+                        <a:t>'patient'</a:t>
                       </a:r>
                       <a:endParaRPr lang="en-GB" sz="1600" b="0" i="0" u="none" strike="noStrike" dirty="0">
                         <a:solidFill>
@@ -3598,7 +3586,19 @@
                         <a:rPr lang="en-GB" sz="1600" u="none" strike="noStrike" dirty="0">
                           <a:effectLst/>
                         </a:rPr>
-                        <a:t>'patient' </a:t>
+                        <a:t>'</a:t>
+                      </a:r>
+                      <a:r>
+                        <a:rPr lang="en-GB" sz="1600" u="none" strike="noStrike" dirty="0" err="1">
+                          <a:effectLst/>
+                        </a:rPr>
+                        <a:t>mutat</a:t>
+                      </a:r>
+                      <a:r>
+                        <a:rPr lang="en-GB" sz="1600" u="none" strike="noStrike" dirty="0">
+                          <a:effectLst/>
+                        </a:rPr>
+                        <a:t>' </a:t>
                       </a:r>
                       <a:endParaRPr lang="en-GB" sz="1600" b="0" i="0" u="none" strike="noStrike" dirty="0">
                         <a:solidFill>
@@ -3702,19 +3702,7 @@
                         <a:rPr lang="en-GB" sz="1600" u="none" strike="noStrike" dirty="0">
                           <a:effectLst/>
                         </a:rPr>
-                        <a:t>'</a:t>
-                      </a:r>
-                      <a:r>
-                        <a:rPr lang="en-GB" sz="1600" u="none" strike="noStrike" dirty="0" err="1">
-                          <a:effectLst/>
-                        </a:rPr>
-                        <a:t>chromosom</a:t>
-                      </a:r>
-                      <a:r>
-                        <a:rPr lang="en-GB" sz="1600" u="none" strike="noStrike" dirty="0">
-                          <a:effectLst/>
-                        </a:rPr>
-                        <a:t>' </a:t>
+                        <a:t>'case' </a:t>
                       </a:r>
                       <a:endParaRPr lang="en-GB" sz="1600" b="0" i="0" u="none" strike="noStrike" dirty="0">
                         <a:solidFill>
@@ -3737,7 +3725,19 @@
                         <a:rPr lang="en-GB" sz="1600" u="none" strike="noStrike" dirty="0">
                           <a:effectLst/>
                         </a:rPr>
-                        <a:t>'case' </a:t>
+                        <a:t>'</a:t>
+                      </a:r>
+                      <a:r>
+                        <a:rPr lang="en-GB" sz="1600" u="none" strike="noStrike" dirty="0" err="1">
+                          <a:effectLst/>
+                        </a:rPr>
+                        <a:t>associ</a:t>
+                      </a:r>
+                      <a:r>
+                        <a:rPr lang="en-GB" sz="1600" u="none" strike="noStrike" dirty="0">
+                          <a:effectLst/>
+                        </a:rPr>
+                        <a:t>' </a:t>
                       </a:r>
                       <a:endParaRPr lang="en-GB" sz="1600" b="0" i="0" u="none" strike="noStrike" dirty="0">
                         <a:solidFill>
@@ -3766,7 +3766,7 @@
                         <a:rPr lang="en-GB" sz="1600" u="none" strike="noStrike" dirty="0" err="1">
                           <a:effectLst/>
                         </a:rPr>
-                        <a:t>famili</a:t>
+                        <a:t>analysi</a:t>
                       </a:r>
                       <a:r>
                         <a:rPr lang="en-GB" sz="1600" u="none" strike="noStrike" dirty="0">
@@ -3801,7 +3801,7 @@
                         <a:rPr lang="en-GB" sz="1600" u="none" strike="noStrike" dirty="0" err="1">
                           <a:effectLst/>
                         </a:rPr>
-                        <a:t>analysi</a:t>
+                        <a:t>famili</a:t>
                       </a:r>
                       <a:r>
                         <a:rPr lang="en-GB" sz="1600" u="none" strike="noStrike" dirty="0">
@@ -3859,7 +3859,7 @@
                         <a:rPr lang="en-GB" sz="1600" u="none" strike="noStrike" dirty="0" err="1">
                           <a:effectLst/>
                         </a:rPr>
-                        <a:t>diseas</a:t>
+                        <a:t>chromosom</a:t>
                       </a:r>
                       <a:r>
                         <a:rPr lang="en-GB" sz="1600" u="none" strike="noStrike" dirty="0">
@@ -3888,19 +3888,7 @@
                         <a:rPr lang="en-GB" sz="1600" u="none" strike="noStrike" dirty="0">
                           <a:effectLst/>
                         </a:rPr>
-                        <a:t>'</a:t>
-                      </a:r>
-                      <a:r>
-                        <a:rPr lang="en-GB" sz="1600" u="none" strike="noStrike" dirty="0" err="1">
-                          <a:effectLst/>
-                        </a:rPr>
-                        <a:t>sequenc</a:t>
-                      </a:r>
-                      <a:r>
-                        <a:rPr lang="en-GB" sz="1600" u="none" strike="noStrike" dirty="0">
-                          <a:effectLst/>
-                        </a:rPr>
-                        <a:t>'</a:t>
+                        <a:t>'disease'</a:t>
                       </a:r>
                       <a:endParaRPr lang="en-GB" sz="1600" b="0" i="0" u="none" strike="noStrike" dirty="0">
                         <a:solidFill>
@@ -3951,7 +3939,7 @@
                       <a:pPr algn="ctr" rtl="0" fontAlgn="ctr"/>
                       <a:r>
                         <a:rPr lang="en-GB" sz="1600" dirty="0"/>
-                        <a:t>10592</a:t>
+                        <a:t>53560</a:t>
                       </a:r>
                       <a:endParaRPr lang="en-GB" sz="1600" b="0" i="0" u="none" strike="noStrike" dirty="0">
                         <a:solidFill>
@@ -3971,125 +3959,10 @@
                     <a:p>
                       <a:pPr algn="l" rtl="0" fontAlgn="ctr"/>
                       <a:r>
-                        <a:rPr lang="en-GB" sz="1600" u="none" strike="noStrike">
-                          <a:effectLst/>
-                        </a:rPr>
-                        <a:t>8798</a:t>
-                      </a:r>
-                      <a:endParaRPr lang="en-GB" sz="1600" b="0" i="0" u="none" strike="noStrike">
-                        <a:solidFill>
-                          <a:srgbClr val="000000"/>
-                        </a:solidFill>
-                        <a:effectLst/>
-                        <a:latin typeface="Calibri" panose="020F0502020204030204" pitchFamily="34" charset="0"/>
-                      </a:endParaRPr>
-                    </a:p>
-                  </a:txBody>
-                  <a:tcPr marL="6350" marR="6350" marT="6350" marB="0" anchor="ctr"/>
-                </a:tc>
-                <a:tc>
-                  <a:txBody>
-                    <a:bodyPr/>
-                    <a:lstStyle/>
-                    <a:p>
-                      <a:pPr algn="l" rtl="0" fontAlgn="ctr"/>
-                      <a:r>
-                        <a:rPr lang="en-GB" sz="1600" u="none" strike="noStrike">
-                          <a:effectLst/>
-                        </a:rPr>
-                        <a:t>8155</a:t>
-                      </a:r>
-                      <a:endParaRPr lang="en-GB" sz="1600" b="0" i="0" u="none" strike="noStrike">
-                        <a:solidFill>
-                          <a:srgbClr val="000000"/>
-                        </a:solidFill>
-                        <a:effectLst/>
-                        <a:latin typeface="Calibri" panose="020F0502020204030204" pitchFamily="34" charset="0"/>
-                      </a:endParaRPr>
-                    </a:p>
-                  </a:txBody>
-                  <a:tcPr marL="6350" marR="6350" marT="6350" marB="0" anchor="ctr"/>
-                </a:tc>
-                <a:tc>
-                  <a:txBody>
-                    <a:bodyPr/>
-                    <a:lstStyle/>
-                    <a:p>
-                      <a:pPr algn="l" rtl="0" fontAlgn="ctr"/>
-                      <a:r>
-                        <a:rPr lang="en-GB" sz="1600" u="none" strike="noStrike">
-                          <a:effectLst/>
-                        </a:rPr>
-                        <a:t>5760</a:t>
-                      </a:r>
-                      <a:endParaRPr lang="en-GB" sz="1600" b="0" i="0" u="none" strike="noStrike">
-                        <a:solidFill>
-                          <a:srgbClr val="000000"/>
-                        </a:solidFill>
-                        <a:effectLst/>
-                        <a:latin typeface="Calibri" panose="020F0502020204030204" pitchFamily="34" charset="0"/>
-                      </a:endParaRPr>
-                    </a:p>
-                  </a:txBody>
-                  <a:tcPr marL="6350" marR="6350" marT="6350" marB="0" anchor="ctr"/>
-                </a:tc>
-                <a:tc>
-                  <a:txBody>
-                    <a:bodyPr/>
-                    <a:lstStyle/>
-                    <a:p>
-                      <a:pPr algn="l" rtl="0" fontAlgn="ctr"/>
-                      <a:r>
-                        <a:rPr lang="en-GB" sz="1600" u="none" strike="noStrike">
-                          <a:effectLst/>
-                        </a:rPr>
-                        <a:t>4831</a:t>
-                      </a:r>
-                      <a:endParaRPr lang="en-GB" sz="1600" b="0" i="0" u="none" strike="noStrike">
-                        <a:solidFill>
-                          <a:srgbClr val="000000"/>
-                        </a:solidFill>
-                        <a:effectLst/>
-                        <a:latin typeface="Calibri" panose="020F0502020204030204" pitchFamily="34" charset="0"/>
-                      </a:endParaRPr>
-                    </a:p>
-                  </a:txBody>
-                  <a:tcPr marL="6350" marR="6350" marT="6350" marB="0" anchor="ctr"/>
-                </a:tc>
-                <a:tc>
-                  <a:txBody>
-                    <a:bodyPr/>
-                    <a:lstStyle/>
-                    <a:p>
-                      <a:pPr algn="l" rtl="0" fontAlgn="ctr"/>
-                      <a:r>
-                        <a:rPr lang="en-GB" sz="1600" u="none" strike="noStrike">
-                          <a:effectLst/>
-                        </a:rPr>
-                        <a:t>4583</a:t>
-                      </a:r>
-                      <a:endParaRPr lang="en-GB" sz="1600" b="0" i="0" u="none" strike="noStrike">
-                        <a:solidFill>
-                          <a:srgbClr val="000000"/>
-                        </a:solidFill>
-                        <a:effectLst/>
-                        <a:latin typeface="Calibri" panose="020F0502020204030204" pitchFamily="34" charset="0"/>
-                      </a:endParaRPr>
-                    </a:p>
-                  </a:txBody>
-                  <a:tcPr marL="6350" marR="6350" marT="6350" marB="0" anchor="ctr"/>
-                </a:tc>
-                <a:tc>
-                  <a:txBody>
-                    <a:bodyPr/>
-                    <a:lstStyle/>
-                    <a:p>
-                      <a:pPr algn="l" rtl="0" fontAlgn="ctr"/>
-                      <a:r>
-                        <a:rPr lang="en-GB" sz="1600" u="none" strike="noStrike" dirty="0">
-                          <a:effectLst/>
-                        </a:rPr>
-                        <a:t>4274</a:t>
+                        <a:rPr lang="en-GB" sz="1600" u="none" strike="noStrike" dirty="0">
+                          <a:effectLst/>
+                        </a:rPr>
+                        <a:t>45394</a:t>
                       </a:r>
                       <a:endParaRPr lang="en-GB" sz="1600" b="0" i="0" u="none" strike="noStrike" dirty="0">
                         <a:solidFill>
@@ -4112,7 +3985,7 @@
                         <a:rPr lang="en-GB" sz="1600" u="none" strike="noStrike" dirty="0">
                           <a:effectLst/>
                         </a:rPr>
-                        <a:t>4193</a:t>
+                        <a:t>45133</a:t>
                       </a:r>
                       <a:endParaRPr lang="en-GB" sz="1600" b="0" i="0" u="none" strike="noStrike" dirty="0">
                         <a:solidFill>
@@ -4135,7 +4008,7 @@
                         <a:rPr lang="en-GB" sz="1600" u="none" strike="noStrike" dirty="0">
                           <a:effectLst/>
                         </a:rPr>
-                        <a:t>4162</a:t>
+                        <a:t>27857</a:t>
                       </a:r>
                       <a:endParaRPr lang="en-GB" sz="1600" b="0" i="0" u="none" strike="noStrike" dirty="0">
                         <a:solidFill>
@@ -4158,7 +4031,7 @@
                         <a:rPr lang="en-GB" sz="1600" u="none" strike="noStrike" dirty="0">
                           <a:effectLst/>
                         </a:rPr>
-                        <a:t>3989</a:t>
+                        <a:t>25693</a:t>
                       </a:r>
                       <a:endParaRPr lang="en-GB" sz="1600" b="0" i="0" u="none" strike="noStrike" dirty="0">
                         <a:solidFill>
@@ -4181,7 +4054,7 @@
                         <a:rPr lang="en-GB" sz="1600" u="none" strike="noStrike" dirty="0">
                           <a:effectLst/>
                         </a:rPr>
-                        <a:t>3921</a:t>
+                        <a:t>21618</a:t>
                       </a:r>
                       <a:endParaRPr lang="en-GB" sz="1600" b="0" i="0" u="none" strike="noStrike" dirty="0">
                         <a:solidFill>
@@ -4201,33 +4074,10 @@
                     <a:p>
                       <a:pPr algn="l" rtl="0" fontAlgn="ctr"/>
                       <a:r>
-                        <a:rPr lang="en-GB" sz="1600" u="none" strike="noStrike">
-                          <a:effectLst/>
-                        </a:rPr>
-                        <a:t>3458</a:t>
-                      </a:r>
-                      <a:endParaRPr lang="en-GB" sz="1600" b="0" i="0" u="none" strike="noStrike">
-                        <a:solidFill>
-                          <a:srgbClr val="000000"/>
-                        </a:solidFill>
-                        <a:effectLst/>
-                        <a:latin typeface="Calibri" panose="020F0502020204030204" pitchFamily="34" charset="0"/>
-                      </a:endParaRPr>
-                    </a:p>
-                  </a:txBody>
-                  <a:tcPr marL="6350" marR="6350" marT="6350" marB="0" anchor="ctr"/>
-                </a:tc>
-                <a:tc>
-                  <a:txBody>
-                    <a:bodyPr/>
-                    <a:lstStyle/>
-                    <a:p>
-                      <a:pPr algn="l" rtl="0" fontAlgn="ctr"/>
-                      <a:r>
-                        <a:rPr lang="en-GB" sz="1600" u="none" strike="noStrike" dirty="0">
-                          <a:effectLst/>
-                        </a:rPr>
-                        <a:t>3309</a:t>
+                        <a:rPr lang="en-GB" sz="1600" u="none" strike="noStrike" dirty="0">
+                          <a:effectLst/>
+                        </a:rPr>
+                        <a:t>20482</a:t>
                       </a:r>
                       <a:endParaRPr lang="en-GB" sz="1600" b="0" i="0" u="none" strike="noStrike" dirty="0">
                         <a:solidFill>
@@ -4240,6 +4090,144 @@
                   </a:txBody>
                   <a:tcPr marL="6350" marR="6350" marT="6350" marB="0" anchor="ctr"/>
                 </a:tc>
+                <a:tc>
+                  <a:txBody>
+                    <a:bodyPr/>
+                    <a:lstStyle/>
+                    <a:p>
+                      <a:pPr algn="l" rtl="0" fontAlgn="ctr"/>
+                      <a:r>
+                        <a:rPr lang="en-GB" sz="1600" u="none" strike="noStrike" dirty="0">
+                          <a:effectLst/>
+                        </a:rPr>
+                        <a:t>19130</a:t>
+                      </a:r>
+                      <a:endParaRPr lang="en-GB" sz="1600" b="0" i="0" u="none" strike="noStrike" dirty="0">
+                        <a:solidFill>
+                          <a:srgbClr val="000000"/>
+                        </a:solidFill>
+                        <a:effectLst/>
+                        <a:latin typeface="Calibri" panose="020F0502020204030204" pitchFamily="34" charset="0"/>
+                      </a:endParaRPr>
+                    </a:p>
+                  </a:txBody>
+                  <a:tcPr marL="6350" marR="6350" marT="6350" marB="0" anchor="ctr"/>
+                </a:tc>
+                <a:tc>
+                  <a:txBody>
+                    <a:bodyPr/>
+                    <a:lstStyle/>
+                    <a:p>
+                      <a:pPr algn="l" rtl="0" fontAlgn="ctr"/>
+                      <a:r>
+                        <a:rPr lang="en-GB" sz="1600" u="none" strike="noStrike" dirty="0">
+                          <a:effectLst/>
+                        </a:rPr>
+                        <a:t>19021</a:t>
+                      </a:r>
+                      <a:endParaRPr lang="en-GB" sz="1600" b="0" i="0" u="none" strike="noStrike" dirty="0">
+                        <a:solidFill>
+                          <a:srgbClr val="000000"/>
+                        </a:solidFill>
+                        <a:effectLst/>
+                        <a:latin typeface="Calibri" panose="020F0502020204030204" pitchFamily="34" charset="0"/>
+                      </a:endParaRPr>
+                    </a:p>
+                  </a:txBody>
+                  <a:tcPr marL="6350" marR="6350" marT="6350" marB="0" anchor="ctr"/>
+                </a:tc>
+                <a:tc>
+                  <a:txBody>
+                    <a:bodyPr/>
+                    <a:lstStyle/>
+                    <a:p>
+                      <a:pPr algn="l" rtl="0" fontAlgn="ctr"/>
+                      <a:r>
+                        <a:rPr lang="en-GB" sz="1600" u="none" strike="noStrike" dirty="0">
+                          <a:effectLst/>
+                        </a:rPr>
+                        <a:t>18871</a:t>
+                      </a:r>
+                      <a:endParaRPr lang="en-GB" sz="1600" b="0" i="0" u="none" strike="noStrike" dirty="0">
+                        <a:solidFill>
+                          <a:srgbClr val="000000"/>
+                        </a:solidFill>
+                        <a:effectLst/>
+                        <a:latin typeface="Calibri" panose="020F0502020204030204" pitchFamily="34" charset="0"/>
+                      </a:endParaRPr>
+                    </a:p>
+                  </a:txBody>
+                  <a:tcPr marL="6350" marR="6350" marT="6350" marB="0" anchor="ctr"/>
+                </a:tc>
+                <a:tc>
+                  <a:txBody>
+                    <a:bodyPr/>
+                    <a:lstStyle/>
+                    <a:p>
+                      <a:pPr algn="l" rtl="0" fontAlgn="ctr"/>
+                      <a:r>
+                        <a:rPr lang="en-GB" sz="1600" u="none" strike="noStrike" dirty="0">
+                          <a:effectLst/>
+                        </a:rPr>
+                        <a:t>18457</a:t>
+                      </a:r>
+                      <a:endParaRPr lang="en-GB" sz="1600" b="0" i="0" u="none" strike="noStrike" dirty="0">
+                        <a:solidFill>
+                          <a:srgbClr val="000000"/>
+                        </a:solidFill>
+                        <a:effectLst/>
+                        <a:latin typeface="Calibri" panose="020F0502020204030204" pitchFamily="34" charset="0"/>
+                      </a:endParaRPr>
+                    </a:p>
+                  </a:txBody>
+                  <a:tcPr marL="6350" marR="6350" marT="6350" marB="0" anchor="ctr"/>
+                </a:tc>
+                <a:tc>
+                  <a:txBody>
+                    <a:bodyPr/>
+                    <a:lstStyle/>
+                    <a:p>
+                      <a:pPr algn="l" rtl="0" fontAlgn="ctr"/>
+                      <a:r>
+                        <a:rPr lang="en-GB" sz="1600" u="none" strike="noStrike" dirty="0">
+                          <a:effectLst/>
+                        </a:rPr>
+                        <a:t>18408</a:t>
+                      </a:r>
+                      <a:endParaRPr lang="en-GB" sz="1600" b="0" i="0" u="none" strike="noStrike" dirty="0">
+                        <a:solidFill>
+                          <a:srgbClr val="000000"/>
+                        </a:solidFill>
+                        <a:effectLst/>
+                        <a:latin typeface="Calibri" panose="020F0502020204030204" pitchFamily="34" charset="0"/>
+                      </a:endParaRPr>
+                    </a:p>
+                  </a:txBody>
+                  <a:tcPr marL="6350" marR="6350" marT="6350" marB="0" anchor="ctr"/>
+                </a:tc>
+                <a:tc>
+                  <a:txBody>
+                    <a:bodyPr/>
+                    <a:lstStyle/>
+                    <a:p>
+                      <a:pPr algn="l" rtl="0" fontAlgn="ctr"/>
+                      <a:r>
+                        <a:rPr lang="en-GB" sz="1600" u="none" strike="noStrike" dirty="0">
+                          <a:effectLst/>
+                        </a:rPr>
+                        <a:t>17660</a:t>
+                      </a:r>
+                      <a:endParaRPr lang="en-GB" sz="1600" b="0" i="0" u="none" strike="noStrike" dirty="0">
+                        <a:solidFill>
+                          <a:srgbClr val="000000"/>
+                        </a:solidFill>
+                        <a:effectLst/>
+                        <a:latin typeface="Calibri" panose="020F0502020204030204" pitchFamily="34" charset="0"/>
+                      </a:endParaRPr>
+                    </a:p>
+                  </a:txBody>
+                  <a:tcPr marL="6350" marR="6350" marT="6350" marB="0" anchor="ctr"/>
+                </a:tc>
                 <a:extLst>
                   <a:ext uri="{0D108BD9-81ED-4DB2-BD59-A6C34878D82A}">
                     <a16:rowId xmlns:a16="http://schemas.microsoft.com/office/drawing/2014/main" val="811124556"/>
@@ -4294,7 +4282,19 @@
                         <a:rPr lang="en-GB" sz="1600" u="none" strike="noStrike" dirty="0">
                           <a:effectLst/>
                         </a:rPr>
-                        <a:t>'gene'</a:t>
+                        <a:t>'</a:t>
+                      </a:r>
+                      <a:r>
+                        <a:rPr lang="en-GB" sz="1600" u="none" strike="noStrike" dirty="0" err="1">
+                          <a:effectLst/>
+                        </a:rPr>
+                        <a:t>delet</a:t>
+                      </a:r>
+                      <a:r>
+                        <a:rPr lang="en-GB" sz="1600" u="none" strike="noStrike" dirty="0">
+                          <a:effectLst/>
+                        </a:rPr>
+                        <a:t>'</a:t>
                       </a:r>
                       <a:endParaRPr lang="en-GB" sz="1600" b="0" i="0" u="none" strike="noStrike" dirty="0">
                         <a:solidFill>
@@ -4317,19 +4317,7 @@
                         <a:rPr lang="en-GB" sz="1600" u="none" strike="noStrike" dirty="0">
                           <a:effectLst/>
                         </a:rPr>
-                        <a:t>'</a:t>
-                      </a:r>
-                      <a:r>
-                        <a:rPr lang="en-GB" sz="1600" u="none" strike="noStrike" dirty="0" err="1">
-                          <a:effectLst/>
-                        </a:rPr>
-                        <a:t>syndrom</a:t>
-                      </a:r>
-                      <a:r>
-                        <a:rPr lang="en-GB" sz="1600" u="none" strike="noStrike" dirty="0">
-                          <a:effectLst/>
-                        </a:rPr>
-                        <a:t>' </a:t>
+                        <a:t>'autism' </a:t>
                       </a:r>
                       <a:endParaRPr lang="en-GB" sz="1600" b="0" i="0" u="none" strike="noStrike" dirty="0">
                         <a:solidFill>
@@ -4358,7 +4346,7 @@
                         <a:rPr lang="en-GB" sz="1600" u="none" strike="noStrike" dirty="0" err="1">
                           <a:effectLst/>
                         </a:rPr>
-                        <a:t>mutat</a:t>
+                        <a:t>syndrom</a:t>
                       </a:r>
                       <a:r>
                         <a:rPr lang="en-GB" sz="1600" u="none" strike="noStrike" dirty="0">
@@ -4387,7 +4375,19 @@
                         <a:rPr lang="en-GB" sz="1600" u="none" strike="noStrike" dirty="0">
                           <a:effectLst/>
                         </a:rPr>
-                        <a:t>'autism' </a:t>
+                        <a:t>'</a:t>
+                      </a:r>
+                      <a:r>
+                        <a:rPr lang="en-GB" sz="1600" u="none" strike="noStrike" dirty="0" err="1">
+                          <a:effectLst/>
+                        </a:rPr>
+                        <a:t>mutat</a:t>
+                      </a:r>
+                      <a:r>
+                        <a:rPr lang="en-GB" sz="1600" u="none" strike="noStrike" dirty="0">
+                          <a:effectLst/>
+                        </a:rPr>
+                        <a:t>' </a:t>
                       </a:r>
                       <a:endParaRPr lang="en-GB" sz="1600" b="0" i="0" u="none" strike="noStrike" dirty="0">
                         <a:solidFill>
@@ -4416,7 +4416,7 @@
                         <a:rPr lang="en-GB" sz="1600" u="none" strike="noStrike" dirty="0" err="1">
                           <a:effectLst/>
                         </a:rPr>
-                        <a:t>asd</a:t>
+                        <a:t>disord</a:t>
                       </a:r>
                       <a:r>
                         <a:rPr lang="en-GB" sz="1600" u="none" strike="noStrike" dirty="0">
@@ -4445,7 +4445,7 @@
                         <a:rPr lang="en-GB" sz="1600" u="none" strike="noStrike" dirty="0">
                           <a:effectLst/>
                         </a:rPr>
-                        <a:t>'clinic' </a:t>
+                        <a:t>'none' </a:t>
                       </a:r>
                       <a:endParaRPr lang="en-GB" sz="1600" b="0" i="0" u="none" strike="noStrike" dirty="0">
                         <a:solidFill>
@@ -4474,7 +4474,7 @@
                         <a:rPr lang="en-GB" sz="1600" u="none" strike="noStrike" dirty="0" err="1">
                           <a:effectLst/>
                         </a:rPr>
-                        <a:t>disord</a:t>
+                        <a:t>chromosom</a:t>
                       </a:r>
                       <a:r>
                         <a:rPr lang="en-GB" sz="1600" u="none" strike="noStrike" dirty="0">
@@ -4503,7 +4503,7 @@
                         <a:rPr lang="en-GB" sz="1600" u="none" strike="noStrike" dirty="0">
                           <a:effectLst/>
                         </a:rPr>
-                        <a:t>'genet' </a:t>
+                        <a:t>'case' </a:t>
                       </a:r>
                       <a:endParaRPr lang="en-GB" sz="1600" b="0" i="0" u="none" strike="noStrike" dirty="0">
                         <a:solidFill>
@@ -4561,7 +4561,7 @@
                         <a:rPr lang="en-GB" sz="1600" u="none" strike="noStrike" dirty="0">
                           <a:effectLst/>
                         </a:rPr>
-                        <a:t>'result' </a:t>
+                        <a:t>'genet' </a:t>
                       </a:r>
                       <a:endParaRPr lang="en-GB" sz="1600" b="0" i="0" u="none" strike="noStrike" dirty="0">
                         <a:solidFill>
@@ -4590,7 +4590,7 @@
                         <a:rPr lang="en-GB" sz="1600" u="none" strike="noStrike" dirty="0" err="1">
                           <a:effectLst/>
                         </a:rPr>
-                        <a:t>diseas</a:t>
+                        <a:t>asd</a:t>
                       </a:r>
                       <a:r>
                         <a:rPr lang="en-GB" sz="1600" u="none" strike="noStrike" dirty="0">
@@ -4625,7 +4625,7 @@
                         <a:rPr lang="en-GB" sz="1600" u="none" strike="noStrike" dirty="0" err="1">
                           <a:effectLst/>
                         </a:rPr>
-                        <a:t>sequenc</a:t>
+                        <a:t>studi</a:t>
                       </a:r>
                       <a:r>
                         <a:rPr lang="en-GB" sz="1600" u="none" strike="noStrike" dirty="0">
@@ -4682,7 +4682,7 @@
                       <a:pPr algn="ctr" rtl="0" fontAlgn="ctr"/>
                       <a:r>
                         <a:rPr lang="en-GB" sz="1600" dirty="0"/>
-                        <a:t>286</a:t>
+                        <a:t>1494</a:t>
                       </a:r>
                       <a:endParaRPr lang="en-GB" sz="1600" b="0" i="0" u="none" strike="noStrike" dirty="0">
                         <a:solidFill>
@@ -4702,31 +4702,10 @@
                     <a:p>
                       <a:pPr algn="l" rtl="0" fontAlgn="ctr"/>
                       <a:r>
-                        <a:rPr lang="en-GB" sz="1600" u="none" strike="noStrike">
-                          <a:effectLst/>
-                        </a:rPr>
-                        <a:t>8618</a:t>
-                      </a:r>
-                      <a:endParaRPr lang="en-GB" sz="1600" b="0" i="0" u="none" strike="noStrike">
-                        <a:solidFill>
-                          <a:srgbClr val="000000"/>
-                        </a:solidFill>
-                        <a:effectLst/>
-                        <a:latin typeface="Calibri" panose="020F0502020204030204" pitchFamily="34" charset="0"/>
-                      </a:endParaRPr>
-                    </a:p>
-                  </a:txBody>
-                  <a:tcPr marL="6350" marR="6350" marT="6350" marB="0" anchor="ctr"/>
-                </a:tc>
-                <a:tc>
-                  <a:txBody>
-                    <a:bodyPr/>
-                    <a:lstStyle/>
-                    <a:p>
-                      <a:pPr algn="l" rtl="0" fontAlgn="ctr"/>
-                      <a:r>
-                        <a:rPr lang="en-GB" sz="1600" dirty="0"/>
-                        <a:t>187</a:t>
+                        <a:rPr lang="en-GB" sz="1600" u="none" strike="noStrike" dirty="0">
+                          <a:effectLst/>
+                        </a:rPr>
+                        <a:t>876</a:t>
                       </a:r>
                       <a:endParaRPr lang="en-GB" sz="1600" b="0" i="0" u="none" strike="noStrike" dirty="0">
                         <a:solidFill>
@@ -4747,7 +4726,7 @@
                       <a:pPr algn="l" rtl="0" fontAlgn="ctr"/>
                       <a:r>
                         <a:rPr lang="en-GB" sz="1600" dirty="0"/>
-                        <a:t>180</a:t>
+                        <a:t>820</a:t>
                       </a:r>
                       <a:endParaRPr lang="en-GB" sz="1600" b="0" i="0" u="none" strike="noStrike" dirty="0">
                         <a:solidFill>
@@ -4768,7 +4747,7 @@
                       <a:pPr algn="l" rtl="0" fontAlgn="ctr"/>
                       <a:r>
                         <a:rPr lang="en-GB" sz="1600" dirty="0"/>
-                        <a:t>165</a:t>
+                        <a:t>788</a:t>
                       </a:r>
                       <a:endParaRPr lang="en-GB" sz="1600" b="0" i="0" u="none" strike="noStrike" dirty="0">
                         <a:solidFill>
@@ -4789,7 +4768,7 @@
                       <a:pPr algn="l" rtl="0" fontAlgn="ctr"/>
                       <a:r>
                         <a:rPr lang="en-GB" sz="1600" dirty="0"/>
-                        <a:t>155</a:t>
+                        <a:t>738</a:t>
                       </a:r>
                       <a:endParaRPr lang="en-GB" sz="1600" b="0" i="0" u="none" strike="noStrike" dirty="0">
                         <a:solidFill>
@@ -4810,7 +4789,7 @@
                       <a:pPr algn="l" rtl="0" fontAlgn="ctr"/>
                       <a:r>
                         <a:rPr lang="en-GB" sz="1600" dirty="0"/>
-                        <a:t>149</a:t>
+                        <a:t>728</a:t>
                       </a:r>
                       <a:endParaRPr lang="en-GB" sz="1600" b="0" i="0" u="none" strike="noStrike" dirty="0">
                         <a:solidFill>
@@ -4831,7 +4810,7 @@
                       <a:pPr algn="l" rtl="0" fontAlgn="ctr"/>
                       <a:r>
                         <a:rPr lang="en-GB" sz="1600" dirty="0"/>
-                        <a:t>146</a:t>
+                        <a:t>696</a:t>
                       </a:r>
                       <a:endParaRPr lang="en-GB" sz="1600" b="0" i="0" u="none" strike="noStrike" dirty="0">
                         <a:solidFill>
@@ -4852,7 +4831,7 @@
                       <a:pPr algn="l" rtl="0" fontAlgn="ctr"/>
                       <a:r>
                         <a:rPr lang="en-GB" sz="1600" dirty="0"/>
-                        <a:t>145</a:t>
+                        <a:t>673</a:t>
                       </a:r>
                       <a:endParaRPr lang="en-GB" sz="1600" b="0" i="0" u="none" strike="noStrike" dirty="0">
                         <a:solidFill>
@@ -4872,10 +4851,8 @@
                     <a:p>
                       <a:pPr algn="l" rtl="0" fontAlgn="ctr"/>
                       <a:r>
-                        <a:rPr lang="en-GB" sz="1600" u="none" strike="noStrike" dirty="0">
-                          <a:effectLst/>
-                        </a:rPr>
-                        <a:t>142</a:t>
+                        <a:rPr lang="en-GB" sz="1600" dirty="0"/>
+                        <a:t>145</a:t>
                       </a:r>
                       <a:endParaRPr lang="en-GB" sz="1600" b="0" i="0" u="none" strike="noStrike" dirty="0">
                         <a:solidFill>
@@ -4898,7 +4875,7 @@
                         <a:rPr lang="en-GB" sz="1600" u="none" strike="noStrike" dirty="0">
                           <a:effectLst/>
                         </a:rPr>
-                        <a:t>138</a:t>
+                        <a:t>646</a:t>
                       </a:r>
                       <a:endParaRPr lang="en-GB" sz="1600" b="0" i="0" u="none" strike="noStrike" dirty="0">
                         <a:solidFill>
@@ -4921,7 +4898,7 @@
                         <a:rPr lang="en-GB" sz="1600" u="none" strike="noStrike" dirty="0">
                           <a:effectLst/>
                         </a:rPr>
-                        <a:t>134</a:t>
+                        <a:t>634</a:t>
                       </a:r>
                       <a:endParaRPr lang="en-GB" sz="1600" b="0" i="0" u="none" strike="noStrike" dirty="0">
                         <a:solidFill>
@@ -4944,7 +4921,7 @@
                         <a:rPr lang="en-GB" sz="1600" u="none" strike="noStrike" dirty="0">
                           <a:effectLst/>
                         </a:rPr>
-                        <a:t>123</a:t>
+                        <a:t>628</a:t>
                       </a:r>
                       <a:endParaRPr lang="en-GB" sz="1600" b="0" i="0" u="none" strike="noStrike" dirty="0">
                         <a:solidFill>
@@ -4953,6 +4930,26 @@
                         <a:effectLst/>
                         <a:latin typeface="Calibri" panose="020F0502020204030204" pitchFamily="34" charset="0"/>
                       </a:endParaRPr>
+                    </a:p>
+                  </a:txBody>
+                  <a:tcPr marL="6350" marR="6350" marT="6350" marB="0" anchor="ctr"/>
+                </a:tc>
+                <a:tc>
+                  <a:txBody>
+                    <a:bodyPr/>
+                    <a:lstStyle/>
+                    <a:p>
+                      <a:pPr algn="l" rtl="0" fontAlgn="ctr"/>
+                      <a:r>
+                        <a:rPr lang="en-GB" sz="1600" b="0" i="0" u="none" strike="noStrike" dirty="0">
+                          <a:solidFill>
+                            <a:srgbClr val="000000"/>
+                          </a:solidFill>
+                          <a:effectLst/>
+                          <a:latin typeface="Calibri" panose="020F0502020204030204" pitchFamily="34" charset="0"/>
+                        </a:rPr>
+                        <a:t>606</a:t>
+                      </a:r>
                     </a:p>
                   </a:txBody>
                   <a:tcPr marL="6350" marR="6350" marT="6350" marB="0" anchor="ctr"/>

</xml_diff>